<commit_message>
Updates to the analysis (permutation addition), diagram figures, and Shiny App to match publication.
</commit_message>
<xml_diff>
--- a/Manuscript/Drafts/Fig Analysis Steps3.pptx
+++ b/Manuscript/Drafts/Fig Analysis Steps3.pptx
@@ -259,7 +259,7 @@
           <a:p>
             <a:fld id="{85B4A8A7-C2FF-4076-BC28-D85526382730}" type="datetimeFigureOut">
               <a:rPr lang="en-US" smtClean="0"/>
-              <a:t>6/30/2023</a:t>
+              <a:t>7/6/2023</a:t>
             </a:fld>
             <a:endParaRPr lang="en-US"/>
           </a:p>
@@ -457,7 +457,7 @@
           <a:p>
             <a:fld id="{85B4A8A7-C2FF-4076-BC28-D85526382730}" type="datetimeFigureOut">
               <a:rPr lang="en-US" smtClean="0"/>
-              <a:t>6/30/2023</a:t>
+              <a:t>7/6/2023</a:t>
             </a:fld>
             <a:endParaRPr lang="en-US"/>
           </a:p>
@@ -665,7 +665,7 @@
           <a:p>
             <a:fld id="{85B4A8A7-C2FF-4076-BC28-D85526382730}" type="datetimeFigureOut">
               <a:rPr lang="en-US" smtClean="0"/>
-              <a:t>6/30/2023</a:t>
+              <a:t>7/6/2023</a:t>
             </a:fld>
             <a:endParaRPr lang="en-US"/>
           </a:p>
@@ -863,7 +863,7 @@
           <a:p>
             <a:fld id="{85B4A8A7-C2FF-4076-BC28-D85526382730}" type="datetimeFigureOut">
               <a:rPr lang="en-US" smtClean="0"/>
-              <a:t>6/30/2023</a:t>
+              <a:t>7/6/2023</a:t>
             </a:fld>
             <a:endParaRPr lang="en-US"/>
           </a:p>
@@ -1138,7 +1138,7 @@
           <a:p>
             <a:fld id="{85B4A8A7-C2FF-4076-BC28-D85526382730}" type="datetimeFigureOut">
               <a:rPr lang="en-US" smtClean="0"/>
-              <a:t>6/30/2023</a:t>
+              <a:t>7/6/2023</a:t>
             </a:fld>
             <a:endParaRPr lang="en-US"/>
           </a:p>
@@ -1403,7 +1403,7 @@
           <a:p>
             <a:fld id="{85B4A8A7-C2FF-4076-BC28-D85526382730}" type="datetimeFigureOut">
               <a:rPr lang="en-US" smtClean="0"/>
-              <a:t>6/30/2023</a:t>
+              <a:t>7/6/2023</a:t>
             </a:fld>
             <a:endParaRPr lang="en-US"/>
           </a:p>
@@ -1815,7 +1815,7 @@
           <a:p>
             <a:fld id="{85B4A8A7-C2FF-4076-BC28-D85526382730}" type="datetimeFigureOut">
               <a:rPr lang="en-US" smtClean="0"/>
-              <a:t>6/30/2023</a:t>
+              <a:t>7/6/2023</a:t>
             </a:fld>
             <a:endParaRPr lang="en-US"/>
           </a:p>
@@ -1956,7 +1956,7 @@
           <a:p>
             <a:fld id="{85B4A8A7-C2FF-4076-BC28-D85526382730}" type="datetimeFigureOut">
               <a:rPr lang="en-US" smtClean="0"/>
-              <a:t>6/30/2023</a:t>
+              <a:t>7/6/2023</a:t>
             </a:fld>
             <a:endParaRPr lang="en-US"/>
           </a:p>
@@ -2069,7 +2069,7 @@
           <a:p>
             <a:fld id="{85B4A8A7-C2FF-4076-BC28-D85526382730}" type="datetimeFigureOut">
               <a:rPr lang="en-US" smtClean="0"/>
-              <a:t>6/30/2023</a:t>
+              <a:t>7/6/2023</a:t>
             </a:fld>
             <a:endParaRPr lang="en-US"/>
           </a:p>
@@ -2380,7 +2380,7 @@
           <a:p>
             <a:fld id="{85B4A8A7-C2FF-4076-BC28-D85526382730}" type="datetimeFigureOut">
               <a:rPr lang="en-US" smtClean="0"/>
-              <a:t>6/30/2023</a:t>
+              <a:t>7/6/2023</a:t>
             </a:fld>
             <a:endParaRPr lang="en-US"/>
           </a:p>
@@ -2668,7 +2668,7 @@
           <a:p>
             <a:fld id="{85B4A8A7-C2FF-4076-BC28-D85526382730}" type="datetimeFigureOut">
               <a:rPr lang="en-US" smtClean="0"/>
-              <a:t>6/30/2023</a:t>
+              <a:t>7/6/2023</a:t>
             </a:fld>
             <a:endParaRPr lang="en-US"/>
           </a:p>
@@ -2909,7 +2909,7 @@
           <a:p>
             <a:fld id="{85B4A8A7-C2FF-4076-BC28-D85526382730}" type="datetimeFigureOut">
               <a:rPr lang="en-US" smtClean="0"/>
-              <a:t>6/30/2023</a:t>
+              <a:t>7/6/2023</a:t>
             </a:fld>
             <a:endParaRPr lang="en-US"/>
           </a:p>
@@ -6132,8 +6132,8 @@
           </p:nvSpPr>
           <p:spPr>
             <a:xfrm>
-              <a:off x="7911181" y="2979512"/>
-              <a:ext cx="1288943" cy="307777"/>
+              <a:off x="8112517" y="2979512"/>
+              <a:ext cx="919226" cy="307777"/>
             </a:xfrm>
             <a:prstGeom prst="rect">
               <a:avLst/>
@@ -6151,7 +6151,7 @@
                   <a:latin typeface="Times New Roman" panose="02020603050405020304" pitchFamily="18" charset="0"/>
                   <a:cs typeface="Times New Roman" panose="02020603050405020304" pitchFamily="18" charset="0"/>
                 </a:rPr>
-                <a:t>⁰C, Visit 1 Year</a:t>
+                <a:t>⁰C, Visit 1</a:t>
               </a:r>
             </a:p>
           </p:txBody>
@@ -6474,9 +6474,9 @@
         <p:grpSpPr>
           <a:xfrm>
             <a:off x="1183444" y="2917093"/>
-            <a:ext cx="3959519" cy="1912681"/>
+            <a:ext cx="3959519" cy="1929336"/>
             <a:chOff x="4302980" y="3909776"/>
-            <a:chExt cx="3959519" cy="1912681"/>
+            <a:chExt cx="3959519" cy="1929336"/>
           </a:xfrm>
         </p:grpSpPr>
         <p:cxnSp>
@@ -6537,9 +6537,9 @@
           <p:grpSpPr>
             <a:xfrm>
               <a:off x="4302980" y="3909776"/>
-              <a:ext cx="3959519" cy="1912681"/>
+              <a:ext cx="3959519" cy="1929336"/>
               <a:chOff x="4302980" y="3909776"/>
-              <a:chExt cx="3959519" cy="1912681"/>
+              <a:chExt cx="3959519" cy="1929336"/>
             </a:xfrm>
           </p:grpSpPr>
           <p:cxnSp>
@@ -6642,8 +6642,8 @@
             </p:nvSpPr>
             <p:spPr>
               <a:xfrm>
-                <a:off x="5659503" y="5514680"/>
-                <a:ext cx="1288943" cy="307777"/>
+                <a:off x="6012817" y="5531335"/>
+                <a:ext cx="919226" cy="307777"/>
               </a:xfrm>
               <a:prstGeom prst="rect">
                 <a:avLst/>
@@ -6661,7 +6661,7 @@
                     <a:latin typeface="Times New Roman" panose="02020603050405020304" pitchFamily="18" charset="0"/>
                     <a:cs typeface="Times New Roman" panose="02020603050405020304" pitchFamily="18" charset="0"/>
                   </a:rPr>
-                  <a:t>⁰C, Visit 1 Year</a:t>
+                  <a:t>⁰C, Visit 1</a:t>
                 </a:r>
               </a:p>
             </p:txBody>
@@ -7247,7 +7247,7 @@
                     <a:latin typeface="Times New Roman" panose="02020603050405020304" pitchFamily="18" charset="0"/>
                     <a:cs typeface="Times New Roman" panose="02020603050405020304" pitchFamily="18" charset="0"/>
                   </a:rPr>
-                  <a:t>C difference in means between tree loss /gain plots</a:t>
+                  <a:t>C difference in means between tree loss / gain plots</a:t>
                 </a:r>
               </a:p>
             </p:txBody>

</xml_diff>